<commit_message>
app and device manager
</commit_message>
<xml_diff>
--- a/Skins/instruction.pptx
+++ b/Skins/instruction.pptx
@@ -6,8 +6,9 @@
   </p:sldMasterIdLst>
   <p:sldIdLst>
     <p:sldId id="256" r:id="rId2"/>
-    <p:sldId id="257" r:id="rId3"/>
-    <p:sldId id="258" r:id="rId4"/>
+    <p:sldId id="259" r:id="rId3"/>
+    <p:sldId id="257" r:id="rId4"/>
+    <p:sldId id="258" r:id="rId5"/>
   </p:sldIdLst>
   <p:sldSz cx="12192000" cy="6858000"/>
   <p:notesSz cx="6858000" cy="9144000"/>
@@ -106,6 +107,11 @@
       </a:defRPr>
     </a:lvl9pPr>
   </p:defaultTextStyle>
+  <p:extLst>
+    <p:ext uri="{EFAFB233-063F-42B5-8137-9DF3F51BA10A}">
+      <p15:sldGuideLst xmlns:p15="http://schemas.microsoft.com/office/powerpoint/2012/main"/>
+    </p:ext>
+  </p:extLst>
 </p:presentation>
 </file>
 
@@ -240,7 +246,7 @@
           <a:p>
             <a:fld id="{C99E7911-D473-429D-A6D3-F363D72432AA}" type="datetimeFigureOut">
               <a:rPr lang="zh-CN" altLang="en-US" smtClean="0"/>
-              <a:t>2019/4/19</a:t>
+              <a:t>2019/5/14</a:t>
             </a:fld>
             <a:endParaRPr lang="zh-CN" altLang="en-US"/>
           </a:p>
@@ -410,7 +416,7 @@
           <a:p>
             <a:fld id="{C99E7911-D473-429D-A6D3-F363D72432AA}" type="datetimeFigureOut">
               <a:rPr lang="zh-CN" altLang="en-US" smtClean="0"/>
-              <a:t>2019/4/19</a:t>
+              <a:t>2019/5/14</a:t>
             </a:fld>
             <a:endParaRPr lang="zh-CN" altLang="en-US"/>
           </a:p>
@@ -590,7 +596,7 @@
           <a:p>
             <a:fld id="{C99E7911-D473-429D-A6D3-F363D72432AA}" type="datetimeFigureOut">
               <a:rPr lang="zh-CN" altLang="en-US" smtClean="0"/>
-              <a:t>2019/4/19</a:t>
+              <a:t>2019/5/14</a:t>
             </a:fld>
             <a:endParaRPr lang="zh-CN" altLang="en-US"/>
           </a:p>
@@ -760,7 +766,7 @@
           <a:p>
             <a:fld id="{C99E7911-D473-429D-A6D3-F363D72432AA}" type="datetimeFigureOut">
               <a:rPr lang="zh-CN" altLang="en-US" smtClean="0"/>
-              <a:t>2019/4/19</a:t>
+              <a:t>2019/5/14</a:t>
             </a:fld>
             <a:endParaRPr lang="zh-CN" altLang="en-US"/>
           </a:p>
@@ -1006,7 +1012,7 @@
           <a:p>
             <a:fld id="{C99E7911-D473-429D-A6D3-F363D72432AA}" type="datetimeFigureOut">
               <a:rPr lang="zh-CN" altLang="en-US" smtClean="0"/>
-              <a:t>2019/4/19</a:t>
+              <a:t>2019/5/14</a:t>
             </a:fld>
             <a:endParaRPr lang="zh-CN" altLang="en-US"/>
           </a:p>
@@ -1238,7 +1244,7 @@
           <a:p>
             <a:fld id="{C99E7911-D473-429D-A6D3-F363D72432AA}" type="datetimeFigureOut">
               <a:rPr lang="zh-CN" altLang="en-US" smtClean="0"/>
-              <a:t>2019/4/19</a:t>
+              <a:t>2019/5/14</a:t>
             </a:fld>
             <a:endParaRPr lang="zh-CN" altLang="en-US"/>
           </a:p>
@@ -1605,7 +1611,7 @@
           <a:p>
             <a:fld id="{C99E7911-D473-429D-A6D3-F363D72432AA}" type="datetimeFigureOut">
               <a:rPr lang="zh-CN" altLang="en-US" smtClean="0"/>
-              <a:t>2019/4/19</a:t>
+              <a:t>2019/5/14</a:t>
             </a:fld>
             <a:endParaRPr lang="zh-CN" altLang="en-US"/>
           </a:p>
@@ -1723,7 +1729,7 @@
           <a:p>
             <a:fld id="{C99E7911-D473-429D-A6D3-F363D72432AA}" type="datetimeFigureOut">
               <a:rPr lang="zh-CN" altLang="en-US" smtClean="0"/>
-              <a:t>2019/4/19</a:t>
+              <a:t>2019/5/14</a:t>
             </a:fld>
             <a:endParaRPr lang="zh-CN" altLang="en-US"/>
           </a:p>
@@ -1818,7 +1824,7 @@
           <a:p>
             <a:fld id="{C99E7911-D473-429D-A6D3-F363D72432AA}" type="datetimeFigureOut">
               <a:rPr lang="zh-CN" altLang="en-US" smtClean="0"/>
-              <a:t>2019/4/19</a:t>
+              <a:t>2019/5/14</a:t>
             </a:fld>
             <a:endParaRPr lang="zh-CN" altLang="en-US"/>
           </a:p>
@@ -2095,7 +2101,7 @@
           <a:p>
             <a:fld id="{C99E7911-D473-429D-A6D3-F363D72432AA}" type="datetimeFigureOut">
               <a:rPr lang="zh-CN" altLang="en-US" smtClean="0"/>
-              <a:t>2019/4/19</a:t>
+              <a:t>2019/5/14</a:t>
             </a:fld>
             <a:endParaRPr lang="zh-CN" altLang="en-US"/>
           </a:p>
@@ -2348,7 +2354,7 @@
           <a:p>
             <a:fld id="{C99E7911-D473-429D-A6D3-F363D72432AA}" type="datetimeFigureOut">
               <a:rPr lang="zh-CN" altLang="en-US" smtClean="0"/>
-              <a:t>2019/4/19</a:t>
+              <a:t>2019/5/14</a:t>
             </a:fld>
             <a:endParaRPr lang="zh-CN" altLang="en-US"/>
           </a:p>
@@ -2561,7 +2567,7 @@
           <a:p>
             <a:fld id="{C99E7911-D473-429D-A6D3-F363D72432AA}" type="datetimeFigureOut">
               <a:rPr lang="zh-CN" altLang="en-US" smtClean="0"/>
-              <a:t>2019/4/19</a:t>
+              <a:t>2019/5/14</a:t>
             </a:fld>
             <a:endParaRPr lang="zh-CN" altLang="en-US"/>
           </a:p>
@@ -3061,6 +3067,470 @@
 </file>
 
 <file path=ppt/slides/slide2.xml><?xml version="1.0" encoding="utf-8"?>
+<p:sld xmlns:a="http://schemas.openxmlformats.org/drawingml/2006/main" xmlns:r="http://schemas.openxmlformats.org/officeDocument/2006/relationships" xmlns:p="http://schemas.openxmlformats.org/presentationml/2006/main">
+  <p:cSld>
+    <p:spTree>
+      <p:nvGrpSpPr>
+        <p:cNvPr id="1" name=""/>
+        <p:cNvGrpSpPr/>
+        <p:nvPr/>
+      </p:nvGrpSpPr>
+      <p:grpSpPr>
+        <a:xfrm>
+          <a:off x="0" y="0"/>
+          <a:ext cx="0" cy="0"/>
+          <a:chOff x="0" y="0"/>
+          <a:chExt cx="0" cy="0"/>
+        </a:xfrm>
+      </p:grpSpPr>
+      <p:sp>
+        <p:nvSpPr>
+          <p:cNvPr id="4" name="文本框 3"/>
+          <p:cNvSpPr txBox="1"/>
+          <p:nvPr/>
+        </p:nvSpPr>
+        <p:spPr>
+          <a:xfrm>
+            <a:off x="283779" y="168166"/>
+            <a:ext cx="1345324" cy="369332"/>
+          </a:xfrm>
+          <a:prstGeom prst="rect">
+            <a:avLst/>
+          </a:prstGeom>
+          <a:noFill/>
+        </p:spPr>
+        <p:txBody>
+          <a:bodyPr wrap="square" rtlCol="0">
+            <a:spAutoFit/>
+          </a:bodyPr>
+          <a:lstStyle/>
+          <a:p>
+            <a:r>
+              <a:rPr lang="en-US" altLang="zh-CN" dirty="0" smtClean="0"/>
+              <a:t>old</a:t>
+            </a:r>
+            <a:endParaRPr lang="zh-CN" altLang="en-US" dirty="0"/>
+          </a:p>
+        </p:txBody>
+      </p:sp>
+      <p:sp>
+        <p:nvSpPr>
+          <p:cNvPr id="6" name="圆角矩形 5"/>
+          <p:cNvSpPr/>
+          <p:nvPr/>
+        </p:nvSpPr>
+        <p:spPr>
+          <a:xfrm>
+            <a:off x="2648607" y="1912883"/>
+            <a:ext cx="1734207" cy="746234"/>
+          </a:xfrm>
+          <a:prstGeom prst="roundRect">
+            <a:avLst/>
+          </a:prstGeom>
+        </p:spPr>
+        <p:style>
+          <a:lnRef idx="2">
+            <a:schemeClr val="accent1">
+              <a:shade val="50000"/>
+            </a:schemeClr>
+          </a:lnRef>
+          <a:fillRef idx="1">
+            <a:schemeClr val="accent1"/>
+          </a:fillRef>
+          <a:effectRef idx="0">
+            <a:schemeClr val="accent1"/>
+          </a:effectRef>
+          <a:fontRef idx="minor">
+            <a:schemeClr val="lt1"/>
+          </a:fontRef>
+        </p:style>
+        <p:txBody>
+          <a:bodyPr rtlCol="0" anchor="ctr"/>
+          <a:lstStyle/>
+          <a:p>
+            <a:pPr algn="ctr"/>
+            <a:r>
+              <a:rPr lang="en-US" altLang="zh-CN" dirty="0" err="1" smtClean="0"/>
+              <a:t>Add_env</a:t>
+            </a:r>
+            <a:endParaRPr lang="zh-CN" altLang="en-US" dirty="0"/>
+          </a:p>
+        </p:txBody>
+      </p:sp>
+      <p:sp>
+        <p:nvSpPr>
+          <p:cNvPr id="7" name="左大括号 6"/>
+          <p:cNvSpPr/>
+          <p:nvPr/>
+        </p:nvSpPr>
+        <p:spPr>
+          <a:xfrm>
+            <a:off x="4382814" y="1681655"/>
+            <a:ext cx="252248" cy="1292773"/>
+          </a:xfrm>
+          <a:prstGeom prst="leftBrace">
+            <a:avLst/>
+          </a:prstGeom>
+        </p:spPr>
+        <p:style>
+          <a:lnRef idx="1">
+            <a:schemeClr val="accent1"/>
+          </a:lnRef>
+          <a:fillRef idx="0">
+            <a:schemeClr val="accent1"/>
+          </a:fillRef>
+          <a:effectRef idx="0">
+            <a:schemeClr val="accent1"/>
+          </a:effectRef>
+          <a:fontRef idx="minor">
+            <a:schemeClr val="tx1"/>
+          </a:fontRef>
+        </p:style>
+        <p:txBody>
+          <a:bodyPr rtlCol="0" anchor="ctr"/>
+          <a:lstStyle/>
+          <a:p>
+            <a:pPr algn="ctr"/>
+            <a:endParaRPr lang="zh-CN" altLang="en-US"/>
+          </a:p>
+        </p:txBody>
+      </p:sp>
+      <p:sp>
+        <p:nvSpPr>
+          <p:cNvPr id="8" name="文本框 7"/>
+          <p:cNvSpPr txBox="1"/>
+          <p:nvPr/>
+        </p:nvSpPr>
+        <p:spPr>
+          <a:xfrm>
+            <a:off x="4635060" y="1555531"/>
+            <a:ext cx="1597573" cy="369332"/>
+          </a:xfrm>
+          <a:prstGeom prst="rect">
+            <a:avLst/>
+          </a:prstGeom>
+          <a:noFill/>
+        </p:spPr>
+        <p:txBody>
+          <a:bodyPr wrap="square" rtlCol="0">
+            <a:spAutoFit/>
+          </a:bodyPr>
+          <a:lstStyle/>
+          <a:p>
+            <a:r>
+              <a:rPr lang="en-US" altLang="zh-CN" dirty="0" smtClean="0"/>
+              <a:t>Rainmeter.exe </a:t>
+            </a:r>
+            <a:endParaRPr lang="zh-CN" altLang="en-US" dirty="0"/>
+          </a:p>
+        </p:txBody>
+      </p:sp>
+      <p:sp>
+        <p:nvSpPr>
+          <p:cNvPr id="9" name="文本框 8"/>
+          <p:cNvSpPr txBox="1"/>
+          <p:nvPr/>
+        </p:nvSpPr>
+        <p:spPr>
+          <a:xfrm>
+            <a:off x="4635059" y="2172702"/>
+            <a:ext cx="1481962" cy="369332"/>
+          </a:xfrm>
+          <a:prstGeom prst="rect">
+            <a:avLst/>
+          </a:prstGeom>
+          <a:noFill/>
+        </p:spPr>
+        <p:txBody>
+          <a:bodyPr wrap="square" rtlCol="0">
+            <a:spAutoFit/>
+          </a:bodyPr>
+          <a:lstStyle/>
+          <a:p>
+            <a:r>
+              <a:rPr lang="en-US" altLang="zh-CN" dirty="0" smtClean="0"/>
+              <a:t>Rainmeter.ini </a:t>
+            </a:r>
+            <a:endParaRPr lang="zh-CN" altLang="en-US" dirty="0"/>
+          </a:p>
+        </p:txBody>
+      </p:sp>
+      <p:sp>
+        <p:nvSpPr>
+          <p:cNvPr id="10" name="文本框 9"/>
+          <p:cNvSpPr txBox="1"/>
+          <p:nvPr/>
+        </p:nvSpPr>
+        <p:spPr>
+          <a:xfrm>
+            <a:off x="4635060" y="2789762"/>
+            <a:ext cx="1135119" cy="369332"/>
+          </a:xfrm>
+          <a:prstGeom prst="rect">
+            <a:avLst/>
+          </a:prstGeom>
+          <a:noFill/>
+        </p:spPr>
+        <p:txBody>
+          <a:bodyPr wrap="square" rtlCol="0">
+            <a:spAutoFit/>
+          </a:bodyPr>
+          <a:lstStyle/>
+          <a:p>
+            <a:r>
+              <a:rPr lang="en-US" altLang="zh-CN" dirty="0" err="1" smtClean="0"/>
+              <a:t>Skinpath</a:t>
+            </a:r>
+            <a:r>
+              <a:rPr lang="en-US" altLang="zh-CN" dirty="0" smtClean="0"/>
+              <a:t> </a:t>
+            </a:r>
+            <a:endParaRPr lang="zh-CN" altLang="en-US" dirty="0"/>
+          </a:p>
+        </p:txBody>
+      </p:sp>
+      <p:sp>
+        <p:nvSpPr>
+          <p:cNvPr id="11" name="圆角矩形 10"/>
+          <p:cNvSpPr/>
+          <p:nvPr/>
+        </p:nvSpPr>
+        <p:spPr>
+          <a:xfrm>
+            <a:off x="2648606" y="3563007"/>
+            <a:ext cx="1734207" cy="746234"/>
+          </a:xfrm>
+          <a:prstGeom prst="roundRect">
+            <a:avLst/>
+          </a:prstGeom>
+        </p:spPr>
+        <p:style>
+          <a:lnRef idx="2">
+            <a:schemeClr val="accent1">
+              <a:shade val="50000"/>
+            </a:schemeClr>
+          </a:lnRef>
+          <a:fillRef idx="1">
+            <a:schemeClr val="accent1"/>
+          </a:fillRef>
+          <a:effectRef idx="0">
+            <a:schemeClr val="accent1"/>
+          </a:effectRef>
+          <a:fontRef idx="minor">
+            <a:schemeClr val="lt1"/>
+          </a:fontRef>
+        </p:style>
+        <p:txBody>
+          <a:bodyPr rtlCol="0" anchor="ctr"/>
+          <a:lstStyle/>
+          <a:p>
+            <a:pPr algn="ctr"/>
+            <a:r>
+              <a:rPr lang="en-US" altLang="zh-CN" dirty="0" err="1" smtClean="0"/>
+              <a:t>makefromxlsx</a:t>
+            </a:r>
+            <a:endParaRPr lang="zh-CN" altLang="en-US" dirty="0"/>
+          </a:p>
+        </p:txBody>
+      </p:sp>
+      <p:sp>
+        <p:nvSpPr>
+          <p:cNvPr id="12" name="文本框 11"/>
+          <p:cNvSpPr txBox="1"/>
+          <p:nvPr/>
+        </p:nvSpPr>
+        <p:spPr>
+          <a:xfrm>
+            <a:off x="4635059" y="3563007"/>
+            <a:ext cx="1860334" cy="923330"/>
+          </a:xfrm>
+          <a:prstGeom prst="rect">
+            <a:avLst/>
+          </a:prstGeom>
+          <a:noFill/>
+        </p:spPr>
+        <p:txBody>
+          <a:bodyPr wrap="square" rtlCol="0">
+            <a:spAutoFit/>
+          </a:bodyPr>
+          <a:lstStyle/>
+          <a:p>
+            <a:r>
+              <a:rPr lang="en-US" altLang="zh-CN" dirty="0" smtClean="0"/>
+              <a:t>Edit and close details.xlsx</a:t>
+            </a:r>
+          </a:p>
+          <a:p>
+            <a:r>
+              <a:rPr lang="en-US" altLang="zh-CN" dirty="0" smtClean="0"/>
+              <a:t>Double run!!</a:t>
+            </a:r>
+            <a:endParaRPr lang="zh-CN" altLang="en-US" dirty="0"/>
+          </a:p>
+        </p:txBody>
+      </p:sp>
+      <p:sp>
+        <p:nvSpPr>
+          <p:cNvPr id="13" name="圆角矩形 12"/>
+          <p:cNvSpPr/>
+          <p:nvPr/>
+        </p:nvSpPr>
+        <p:spPr>
+          <a:xfrm>
+            <a:off x="2648605" y="4950371"/>
+            <a:ext cx="1734207" cy="746234"/>
+          </a:xfrm>
+          <a:prstGeom prst="roundRect">
+            <a:avLst/>
+          </a:prstGeom>
+        </p:spPr>
+        <p:style>
+          <a:lnRef idx="2">
+            <a:schemeClr val="accent1">
+              <a:shade val="50000"/>
+            </a:schemeClr>
+          </a:lnRef>
+          <a:fillRef idx="1">
+            <a:schemeClr val="accent1"/>
+          </a:fillRef>
+          <a:effectRef idx="0">
+            <a:schemeClr val="accent1"/>
+          </a:effectRef>
+          <a:fontRef idx="minor">
+            <a:schemeClr val="lt1"/>
+          </a:fontRef>
+        </p:style>
+        <p:txBody>
+          <a:bodyPr rtlCol="0" anchor="ctr"/>
+          <a:lstStyle/>
+          <a:p>
+            <a:pPr algn="ctr"/>
+            <a:r>
+              <a:rPr lang="en-US" altLang="zh-CN" dirty="0" smtClean="0"/>
+              <a:t>align</a:t>
+            </a:r>
+            <a:endParaRPr lang="zh-CN" altLang="en-US" dirty="0"/>
+          </a:p>
+        </p:txBody>
+      </p:sp>
+      <p:sp>
+        <p:nvSpPr>
+          <p:cNvPr id="14" name="文本框 13"/>
+          <p:cNvSpPr txBox="1"/>
+          <p:nvPr/>
+        </p:nvSpPr>
+        <p:spPr>
+          <a:xfrm>
+            <a:off x="4719142" y="4950371"/>
+            <a:ext cx="1860334" cy="646331"/>
+          </a:xfrm>
+          <a:prstGeom prst="rect">
+            <a:avLst/>
+          </a:prstGeom>
+          <a:noFill/>
+        </p:spPr>
+        <p:txBody>
+          <a:bodyPr wrap="square" rtlCol="0">
+            <a:spAutoFit/>
+          </a:bodyPr>
+          <a:lstStyle/>
+          <a:p>
+            <a:r>
+              <a:rPr lang="en-US" altLang="zh-CN" dirty="0" smtClean="0"/>
+              <a:t>May need set center</a:t>
+            </a:r>
+            <a:endParaRPr lang="zh-CN" altLang="en-US" dirty="0"/>
+          </a:p>
+        </p:txBody>
+      </p:sp>
+      <p:sp>
+        <p:nvSpPr>
+          <p:cNvPr id="15" name="圆角矩形 14"/>
+          <p:cNvSpPr/>
+          <p:nvPr/>
+        </p:nvSpPr>
+        <p:spPr>
+          <a:xfrm>
+            <a:off x="2580286" y="525519"/>
+            <a:ext cx="1870844" cy="746234"/>
+          </a:xfrm>
+          <a:prstGeom prst="roundRect">
+            <a:avLst/>
+          </a:prstGeom>
+        </p:spPr>
+        <p:style>
+          <a:lnRef idx="2">
+            <a:schemeClr val="accent1">
+              <a:shade val="50000"/>
+            </a:schemeClr>
+          </a:lnRef>
+          <a:fillRef idx="1">
+            <a:schemeClr val="accent1"/>
+          </a:fillRef>
+          <a:effectRef idx="0">
+            <a:schemeClr val="accent1"/>
+          </a:effectRef>
+          <a:fontRef idx="minor">
+            <a:schemeClr val="lt1"/>
+          </a:fontRef>
+        </p:style>
+        <p:txBody>
+          <a:bodyPr rtlCol="0" anchor="ctr"/>
+          <a:lstStyle/>
+          <a:p>
+            <a:pPr algn="ctr"/>
+            <a:r>
+              <a:rPr lang="en-US" altLang="zh-CN" dirty="0" err="1" smtClean="0"/>
+              <a:t>Initial_wallpaper</a:t>
+            </a:r>
+            <a:endParaRPr lang="zh-CN" altLang="en-US" dirty="0"/>
+          </a:p>
+        </p:txBody>
+      </p:sp>
+      <p:sp>
+        <p:nvSpPr>
+          <p:cNvPr id="16" name="文本框 15"/>
+          <p:cNvSpPr txBox="1"/>
+          <p:nvPr/>
+        </p:nvSpPr>
+        <p:spPr>
+          <a:xfrm>
+            <a:off x="4719142" y="537498"/>
+            <a:ext cx="2795755" cy="369332"/>
+          </a:xfrm>
+          <a:prstGeom prst="rect">
+            <a:avLst/>
+          </a:prstGeom>
+          <a:noFill/>
+        </p:spPr>
+        <p:txBody>
+          <a:bodyPr wrap="square" rtlCol="0">
+            <a:spAutoFit/>
+          </a:bodyPr>
+          <a:lstStyle/>
+          <a:p>
+            <a:r>
+              <a:rPr lang="en-US" altLang="zh-CN" dirty="0" smtClean="0"/>
+              <a:t>May disable cause reboot</a:t>
+            </a:r>
+            <a:endParaRPr lang="zh-CN" altLang="en-US" dirty="0"/>
+          </a:p>
+        </p:txBody>
+      </p:sp>
+    </p:spTree>
+    <p:extLst>
+      <p:ext uri="{BB962C8B-B14F-4D97-AF65-F5344CB8AC3E}">
+        <p14:creationId xmlns:p14="http://schemas.microsoft.com/office/powerpoint/2010/main" val="2096246983"/>
+      </p:ext>
+    </p:extLst>
+  </p:cSld>
+  <p:clrMapOvr>
+    <a:masterClrMapping/>
+  </p:clrMapOvr>
+</p:sld>
+</file>
+
+<file path=ppt/slides/slide3.xml><?xml version="1.0" encoding="utf-8"?>
 <p:sld xmlns:a="http://schemas.openxmlformats.org/drawingml/2006/main" xmlns:r="http://schemas.openxmlformats.org/officeDocument/2006/relationships" xmlns:p="http://schemas.openxmlformats.org/presentationml/2006/main">
   <p:cSld>
     <p:spTree>
@@ -5176,6 +5646,36 @@
           </p:txBody>
         </p:sp>
       </p:grpSp>
+      <p:sp>
+        <p:nvSpPr>
+          <p:cNvPr id="2" name="文本框 1"/>
+          <p:cNvSpPr txBox="1"/>
+          <p:nvPr/>
+        </p:nvSpPr>
+        <p:spPr>
+          <a:xfrm>
+            <a:off x="283779" y="168166"/>
+            <a:ext cx="1345324" cy="369332"/>
+          </a:xfrm>
+          <a:prstGeom prst="rect">
+            <a:avLst/>
+          </a:prstGeom>
+          <a:noFill/>
+        </p:spPr>
+        <p:txBody>
+          <a:bodyPr wrap="square" rtlCol="0">
+            <a:spAutoFit/>
+          </a:bodyPr>
+          <a:lstStyle/>
+          <a:p>
+            <a:r>
+              <a:rPr lang="en-US" altLang="zh-CN" dirty="0" smtClean="0"/>
+              <a:t>old</a:t>
+            </a:r>
+            <a:endParaRPr lang="zh-CN" altLang="en-US" dirty="0"/>
+          </a:p>
+        </p:txBody>
+      </p:sp>
     </p:spTree>
     <p:extLst>
       <p:ext uri="{BB962C8B-B14F-4D97-AF65-F5344CB8AC3E}">
@@ -5189,7 +5689,7 @@
 </p:sld>
 </file>
 
-<file path=ppt/slides/slide3.xml><?xml version="1.0" encoding="utf-8"?>
+<file path=ppt/slides/slide4.xml><?xml version="1.0" encoding="utf-8"?>
 <p:sld xmlns:a="http://schemas.openxmlformats.org/drawingml/2006/main" xmlns:r="http://schemas.openxmlformats.org/officeDocument/2006/relationships" xmlns:p="http://schemas.openxmlformats.org/presentationml/2006/main">
   <p:cSld>
     <p:spTree>
@@ -5268,11 +5768,7 @@
           <a:p>
             <a:r>
               <a:rPr lang="en-US" altLang="zh-CN" dirty="0" smtClean="0"/>
-              <a:t>2. </a:t>
-            </a:r>
-            <a:r>
-              <a:rPr lang="en-US" altLang="zh-CN" dirty="0" smtClean="0"/>
-              <a:t>can’t use </a:t>
+              <a:t>2. can’t use </a:t>
             </a:r>
             <a:r>
               <a:rPr lang="en-US" altLang="zh-CN" dirty="0" err="1" smtClean="0"/>

</xml_diff>